<commit_message>
correção de grallha no nome
</commit_message>
<xml_diff>
--- a/DJW/presentation/Jogo.pptx
+++ b/DJW/presentation/Jogo.pptx
@@ -3512,7 +3512,7 @@
           </a:bodyPr>
           <a:lstStyle/>
           <a:p>
-            <a:endParaRPr lang="en-US" sz="1100">
+            <a:endParaRPr lang="en-US" sz="1100" dirty="0">
               <a:solidFill>
                 <a:srgbClr val="FFFFFF"/>
               </a:solidFill>
@@ -3520,27 +3520,51 @@
           </a:p>
           <a:p>
             <a:r>
-              <a:rPr lang="en-US" sz="1100">
+              <a:rPr lang="en-US" sz="1100" dirty="0" err="1">
                 <a:solidFill>
                   <a:srgbClr val="FFFFFF"/>
                 </a:solidFill>
               </a:rPr>
-              <a:t>Elaborado por:</a:t>
-            </a:r>
-          </a:p>
-          <a:p>
-            <a:r>
-              <a:rPr lang="en-US" sz="1100">
+              <a:t>Elaborado</a:t>
+            </a:r>
+            <a:r>
+              <a:rPr lang="en-US" sz="1100" dirty="0">
                 <a:solidFill>
                   <a:srgbClr val="FFFFFF"/>
                 </a:solidFill>
               </a:rPr>
-              <a:t>Diogo Guimarães nº29528</a:t>
-            </a:r>
-          </a:p>
-          <a:p>
-            <a:r>
-              <a:rPr lang="en-US" sz="1100">
+              <a:t> por:</a:t>
+            </a:r>
+          </a:p>
+          <a:p>
+            <a:r>
+              <a:rPr lang="en-US" sz="1100" dirty="0">
+                <a:solidFill>
+                  <a:srgbClr val="FFFFFF"/>
+                </a:solidFill>
+              </a:rPr>
+              <a:t>Diogo </a:t>
+            </a:r>
+            <a:r>
+              <a:rPr lang="en-US" sz="1100" dirty="0" err="1">
+                <a:solidFill>
+                  <a:srgbClr val="FFFFFF"/>
+                </a:solidFill>
+              </a:rPr>
+              <a:t>Guimarães</a:t>
+            </a:r>
+            <a:r>
+              <a:rPr lang="en-US" sz="1100" dirty="0">
+                <a:solidFill>
+                  <a:srgbClr val="FFFFFF"/>
+                </a:solidFill>
+              </a:rPr>
+              <a:t> nº39528</a:t>
+            </a:r>
+          </a:p>
+          <a:p>
+            <a:r>
+              <a:rPr lang="en-US" sz="1100" dirty="0">
                 <a:solidFill>
                   <a:srgbClr val="FFFFFF"/>
                 </a:solidFill>
@@ -3712,7 +3736,7 @@
           <a:p>
             <a:pPr algn="r"/>
             <a:r>
-              <a:rPr lang="pt-PT" sz="4000">
+              <a:rPr lang="pt-PT" sz="4000" dirty="0">
                 <a:solidFill>
                   <a:srgbClr val="FFFFFF"/>
                 </a:solidFill>
@@ -5873,6 +5897,21 @@
 </file>
 
 <file path=customXml/item1.xml><?xml version="1.0" encoding="utf-8"?>
+<p:properties xmlns:p="http://schemas.microsoft.com/office/2006/metadata/properties" xmlns:xsi="http://www.w3.org/2001/XMLSchema-instance" xmlns:pc="http://schemas.microsoft.com/office/infopath/2007/PartnerControls">
+  <documentManagement/>
+</p:properties>
+</file>
+
+<file path=customXml/item2.xml><?xml version="1.0" encoding="utf-8"?>
+<?mso-contentType ?>
+<FormTemplates xmlns="http://schemas.microsoft.com/sharepoint/v3/contenttype/forms">
+  <Display>DocumentLibraryForm</Display>
+  <Edit>DocumentLibraryForm</Edit>
+  <New>DocumentLibraryForm</New>
+</FormTemplates>
+</file>
+
+<file path=customXml/item3.xml><?xml version="1.0" encoding="utf-8"?>
 <ct:contentTypeSchema xmlns:ct="http://schemas.microsoft.com/office/2006/metadata/contentType" xmlns:ma="http://schemas.microsoft.com/office/2006/metadata/properties/metaAttributes" ct:_="" ma:_="" ma:contentTypeName="Documento" ma:contentTypeID="0x0101009C5DFCF2F47D4E4A83232B07BDBD642B" ma:contentTypeVersion="4" ma:contentTypeDescription="Criar um novo documento." ma:contentTypeScope="" ma:versionID="6131feb8c407ee0d9c2a06b489d373ba">
   <xsd:schema xmlns:xsd="http://www.w3.org/2001/XMLSchema" xmlns:xs="http://www.w3.org/2001/XMLSchema" xmlns:p="http://schemas.microsoft.com/office/2006/metadata/properties" xmlns:ns3="40dcc32e-9b85-400f-9629-26c4b9340020" targetNamespace="http://schemas.microsoft.com/office/2006/metadata/properties" ma:root="true" ma:fieldsID="c957df1bea618c82622e58a59f8f5ede" ns3:_="">
     <xsd:import namespace="40dcc32e-9b85-400f-9629-26c4b9340020"/>
@@ -6016,22 +6055,31 @@
 </ct:contentTypeSchema>
 </file>
 
-<file path=customXml/item2.xml><?xml version="1.0" encoding="utf-8"?>
-<?mso-contentType ?>
-<FormTemplates xmlns="http://schemas.microsoft.com/sharepoint/v3/contenttype/forms">
-  <Display>DocumentLibraryForm</Display>
-  <Edit>DocumentLibraryForm</Edit>
-  <New>DocumentLibraryForm</New>
-</FormTemplates>
+<file path=customXml/itemProps1.xml><?xml version="1.0" encoding="utf-8"?>
+<ds:datastoreItem xmlns:ds="http://schemas.openxmlformats.org/officeDocument/2006/customXml" ds:itemID="{9B68FA17-7ACC-4512-8F76-37BBB1728E1F}">
+  <ds:schemaRefs>
+    <ds:schemaRef ds:uri="http://purl.org/dc/dcmitype/"/>
+    <ds:schemaRef ds:uri="http://schemas.openxmlformats.org/package/2006/metadata/core-properties"/>
+    <ds:schemaRef ds:uri="http://schemas.microsoft.com/office/2006/metadata/properties"/>
+    <ds:schemaRef ds:uri="http://www.w3.org/XML/1998/namespace"/>
+    <ds:schemaRef ds:uri="http://schemas.microsoft.com/office/infopath/2007/PartnerControls"/>
+    <ds:schemaRef ds:uri="http://purl.org/dc/elements/1.1/"/>
+    <ds:schemaRef ds:uri="40dcc32e-9b85-400f-9629-26c4b9340020"/>
+    <ds:schemaRef ds:uri="http://purl.org/dc/terms/"/>
+    <ds:schemaRef ds:uri="http://schemas.microsoft.com/office/2006/documentManagement/types"/>
+  </ds:schemaRefs>
+</ds:datastoreItem>
 </file>
 
-<file path=customXml/item3.xml><?xml version="1.0" encoding="utf-8"?>
-<p:properties xmlns:p="http://schemas.microsoft.com/office/2006/metadata/properties" xmlns:xsi="http://www.w3.org/2001/XMLSchema-instance" xmlns:pc="http://schemas.microsoft.com/office/infopath/2007/PartnerControls">
-  <documentManagement/>
-</p:properties>
+<file path=customXml/itemProps2.xml><?xml version="1.0" encoding="utf-8"?>
+<ds:datastoreItem xmlns:ds="http://schemas.openxmlformats.org/officeDocument/2006/customXml" ds:itemID="{AEB98B45-4313-4ABB-8C34-A67242AD364C}">
+  <ds:schemaRefs>
+    <ds:schemaRef ds:uri="http://schemas.microsoft.com/sharepoint/v3/contenttype/forms"/>
+  </ds:schemaRefs>
+</ds:datastoreItem>
 </file>
 
-<file path=customXml/itemProps1.xml><?xml version="1.0" encoding="utf-8"?>
+<file path=customXml/itemProps3.xml><?xml version="1.0" encoding="utf-8"?>
 <ds:datastoreItem xmlns:ds="http://schemas.openxmlformats.org/officeDocument/2006/customXml" ds:itemID="{C253FCF0-9435-4F5F-B202-1389407F61C0}">
   <ds:schemaRefs>
     <ds:schemaRef ds:uri="http://schemas.microsoft.com/office/2006/metadata/contentType"/>
@@ -6047,28 +6095,4 @@
     <ds:schemaRef ds:uri="http://schemas.microsoft.com/internal/obd"/>
   </ds:schemaRefs>
 </ds:datastoreItem>
-</file>
-
-<file path=customXml/itemProps2.xml><?xml version="1.0" encoding="utf-8"?>
-<ds:datastoreItem xmlns:ds="http://schemas.openxmlformats.org/officeDocument/2006/customXml" ds:itemID="{AEB98B45-4313-4ABB-8C34-A67242AD364C}">
-  <ds:schemaRefs>
-    <ds:schemaRef ds:uri="http://schemas.microsoft.com/sharepoint/v3/contenttype/forms"/>
-  </ds:schemaRefs>
-</ds:datastoreItem>
-</file>
-
-<file path=customXml/itemProps3.xml><?xml version="1.0" encoding="utf-8"?>
-<ds:datastoreItem xmlns:ds="http://schemas.openxmlformats.org/officeDocument/2006/customXml" ds:itemID="{9B68FA17-7ACC-4512-8F76-37BBB1728E1F}">
-  <ds:schemaRefs>
-    <ds:schemaRef ds:uri="http://purl.org/dc/dcmitype/"/>
-    <ds:schemaRef ds:uri="http://schemas.openxmlformats.org/package/2006/metadata/core-properties"/>
-    <ds:schemaRef ds:uri="http://schemas.microsoft.com/office/2006/metadata/properties"/>
-    <ds:schemaRef ds:uri="http://www.w3.org/XML/1998/namespace"/>
-    <ds:schemaRef ds:uri="http://schemas.microsoft.com/office/infopath/2007/PartnerControls"/>
-    <ds:schemaRef ds:uri="http://purl.org/dc/elements/1.1/"/>
-    <ds:schemaRef ds:uri="40dcc32e-9b85-400f-9629-26c4b9340020"/>
-    <ds:schemaRef ds:uri="http://purl.org/dc/terms/"/>
-    <ds:schemaRef ds:uri="http://schemas.microsoft.com/office/2006/documentManagement/types"/>
-  </ds:schemaRefs>
-</ds:datastoreItem>
 </file>
</xml_diff>